<commit_message>
shell scripts for testing
</commit_message>
<xml_diff>
--- a/desired_outcome/output.pptx
+++ b/desired_outcome/output.pptx
@@ -149,7 +149,7 @@
 <file path=ppt/charts/chart1.xml><?xml version="1.0" encoding="utf-8"?>
 <c:chartSpace xmlns:c="http://schemas.openxmlformats.org/drawingml/2006/chart" xmlns:a="http://schemas.openxmlformats.org/drawingml/2006/main" xmlns:r="http://schemas.openxmlformats.org/officeDocument/2006/relationships" xmlns:c16r2="http://schemas.microsoft.com/office/drawing/2015/06/chart">
   <c:date1904 val="0"/>
-  <c:lang val="en-US"/>
+  <c:lang val="en-GB"/>
   <c:roundedCorners val="0"/>
   <mc:AlternateContent xmlns:mc="http://schemas.openxmlformats.org/markup-compatibility/2006">
     <mc:Choice xmlns:c14="http://schemas.microsoft.com/office/drawing/2007/8/2/chart" Requires="c14">
@@ -574,7 +574,7 @@
 <file path=ppt/charts/chart2.xml><?xml version="1.0" encoding="utf-8"?>
 <c:chartSpace xmlns:c="http://schemas.openxmlformats.org/drawingml/2006/chart" xmlns:a="http://schemas.openxmlformats.org/drawingml/2006/main" xmlns:r="http://schemas.openxmlformats.org/officeDocument/2006/relationships" xmlns:c16r2="http://schemas.microsoft.com/office/drawing/2015/06/chart">
   <c:date1904 val="0"/>
-  <c:lang val="en-US"/>
+  <c:lang val="en-GB"/>
   <c:roundedCorners val="0"/>
   <mc:AlternateContent xmlns:mc="http://schemas.openxmlformats.org/markup-compatibility/2006">
     <mc:Choice xmlns:c14="http://schemas.microsoft.com/office/drawing/2007/8/2/chart" Requires="c14">
@@ -2317,7 +2317,7 @@
           <a:p>
             <a:fld id="{076F8740-9884-F043-8599-72200904ADC3}" type="datetimeFigureOut">
               <a:rPr lang="en-GB" smtClean="0"/>
-              <a:t>01/10/2020</a:t>
+              <a:t>12/10/2020</a:t>
             </a:fld>
             <a:endParaRPr lang="en-GB"/>
           </a:p>
@@ -2515,7 +2515,7 @@
           <a:p>
             <a:fld id="{076F8740-9884-F043-8599-72200904ADC3}" type="datetimeFigureOut">
               <a:rPr lang="en-GB" smtClean="0"/>
-              <a:t>01/10/2020</a:t>
+              <a:t>12/10/2020</a:t>
             </a:fld>
             <a:endParaRPr lang="en-GB"/>
           </a:p>
@@ -2723,7 +2723,7 @@
           <a:p>
             <a:fld id="{076F8740-9884-F043-8599-72200904ADC3}" type="datetimeFigureOut">
               <a:rPr lang="en-GB" smtClean="0"/>
-              <a:t>01/10/2020</a:t>
+              <a:t>12/10/2020</a:t>
             </a:fld>
             <a:endParaRPr lang="en-GB"/>
           </a:p>
@@ -2921,7 +2921,7 @@
           <a:p>
             <a:fld id="{076F8740-9884-F043-8599-72200904ADC3}" type="datetimeFigureOut">
               <a:rPr lang="en-GB" smtClean="0"/>
-              <a:t>01/10/2020</a:t>
+              <a:t>12/10/2020</a:t>
             </a:fld>
             <a:endParaRPr lang="en-GB"/>
           </a:p>
@@ -3196,7 +3196,7 @@
           <a:p>
             <a:fld id="{076F8740-9884-F043-8599-72200904ADC3}" type="datetimeFigureOut">
               <a:rPr lang="en-GB" smtClean="0"/>
-              <a:t>01/10/2020</a:t>
+              <a:t>12/10/2020</a:t>
             </a:fld>
             <a:endParaRPr lang="en-GB"/>
           </a:p>
@@ -3461,7 +3461,7 @@
           <a:p>
             <a:fld id="{076F8740-9884-F043-8599-72200904ADC3}" type="datetimeFigureOut">
               <a:rPr lang="en-GB" smtClean="0"/>
-              <a:t>01/10/2020</a:t>
+              <a:t>12/10/2020</a:t>
             </a:fld>
             <a:endParaRPr lang="en-GB"/>
           </a:p>
@@ -3873,7 +3873,7 @@
           <a:p>
             <a:fld id="{076F8740-9884-F043-8599-72200904ADC3}" type="datetimeFigureOut">
               <a:rPr lang="en-GB" smtClean="0"/>
-              <a:t>01/10/2020</a:t>
+              <a:t>12/10/2020</a:t>
             </a:fld>
             <a:endParaRPr lang="en-GB"/>
           </a:p>
@@ -4014,7 +4014,7 @@
           <a:p>
             <a:fld id="{076F8740-9884-F043-8599-72200904ADC3}" type="datetimeFigureOut">
               <a:rPr lang="en-GB" smtClean="0"/>
-              <a:t>01/10/2020</a:t>
+              <a:t>12/10/2020</a:t>
             </a:fld>
             <a:endParaRPr lang="en-GB"/>
           </a:p>
@@ -4127,7 +4127,7 @@
           <a:p>
             <a:fld id="{076F8740-9884-F043-8599-72200904ADC3}" type="datetimeFigureOut">
               <a:rPr lang="en-GB" smtClean="0"/>
-              <a:t>01/10/2020</a:t>
+              <a:t>12/10/2020</a:t>
             </a:fld>
             <a:endParaRPr lang="en-GB"/>
           </a:p>
@@ -4438,7 +4438,7 @@
           <a:p>
             <a:fld id="{076F8740-9884-F043-8599-72200904ADC3}" type="datetimeFigureOut">
               <a:rPr lang="en-GB" smtClean="0"/>
-              <a:t>01/10/2020</a:t>
+              <a:t>12/10/2020</a:t>
             </a:fld>
             <a:endParaRPr lang="en-GB"/>
           </a:p>
@@ -4726,7 +4726,7 @@
           <a:p>
             <a:fld id="{076F8740-9884-F043-8599-72200904ADC3}" type="datetimeFigureOut">
               <a:rPr lang="en-GB" smtClean="0"/>
-              <a:t>01/10/2020</a:t>
+              <a:t>12/10/2020</a:t>
             </a:fld>
             <a:endParaRPr lang="en-GB"/>
           </a:p>
@@ -4967,7 +4967,7 @@
           <a:p>
             <a:fld id="{076F8740-9884-F043-8599-72200904ADC3}" type="datetimeFigureOut">
               <a:rPr lang="en-GB" smtClean="0"/>
-              <a:t>01/10/2020</a:t>
+              <a:t>12/10/2020</a:t>
             </a:fld>
             <a:endParaRPr lang="en-GB"/>
           </a:p>

</xml_diff>